<commit_message>
Some minor adjustments to the BigInteger example.
</commit_message>
<xml_diff>
--- a/BigInteger/doc/LifeCycle.pptx
+++ b/BigInteger/doc/LifeCycle.pptx
@@ -296,7 +296,7 @@
           <a:p>
             <a:fld id="{86FBC258-72DF-554D-86CC-F268512C5582}" type="datetimeFigureOut">
               <a:rPr lang="en-US" smtClean="0"/>
-              <a:t>6/15/23</a:t>
+              <a:t>9/25/23</a:t>
             </a:fld>
             <a:endParaRPr lang="en-US"/>
           </a:p>
@@ -494,7 +494,7 @@
           <a:p>
             <a:fld id="{86FBC258-72DF-554D-86CC-F268512C5582}" type="datetimeFigureOut">
               <a:rPr lang="en-US" smtClean="0"/>
-              <a:t>6/15/23</a:t>
+              <a:t>9/25/23</a:t>
             </a:fld>
             <a:endParaRPr lang="en-US"/>
           </a:p>
@@ -702,7 +702,7 @@
           <a:p>
             <a:fld id="{86FBC258-72DF-554D-86CC-F268512C5582}" type="datetimeFigureOut">
               <a:rPr lang="en-US" smtClean="0"/>
-              <a:t>6/15/23</a:t>
+              <a:t>9/25/23</a:t>
             </a:fld>
             <a:endParaRPr lang="en-US"/>
           </a:p>
@@ -900,7 +900,7 @@
           <a:p>
             <a:fld id="{86FBC258-72DF-554D-86CC-F268512C5582}" type="datetimeFigureOut">
               <a:rPr lang="en-US" smtClean="0"/>
-              <a:t>6/15/23</a:t>
+              <a:t>9/25/23</a:t>
             </a:fld>
             <a:endParaRPr lang="en-US"/>
           </a:p>
@@ -1175,7 +1175,7 @@
           <a:p>
             <a:fld id="{86FBC258-72DF-554D-86CC-F268512C5582}" type="datetimeFigureOut">
               <a:rPr lang="en-US" smtClean="0"/>
-              <a:t>6/15/23</a:t>
+              <a:t>9/25/23</a:t>
             </a:fld>
             <a:endParaRPr lang="en-US"/>
           </a:p>
@@ -1440,7 +1440,7 @@
           <a:p>
             <a:fld id="{86FBC258-72DF-554D-86CC-F268512C5582}" type="datetimeFigureOut">
               <a:rPr lang="en-US" smtClean="0"/>
-              <a:t>6/15/23</a:t>
+              <a:t>9/25/23</a:t>
             </a:fld>
             <a:endParaRPr lang="en-US"/>
           </a:p>
@@ -1852,7 +1852,7 @@
           <a:p>
             <a:fld id="{86FBC258-72DF-554D-86CC-F268512C5582}" type="datetimeFigureOut">
               <a:rPr lang="en-US" smtClean="0"/>
-              <a:t>6/15/23</a:t>
+              <a:t>9/25/23</a:t>
             </a:fld>
             <a:endParaRPr lang="en-US"/>
           </a:p>
@@ -1993,7 +1993,7 @@
           <a:p>
             <a:fld id="{86FBC258-72DF-554D-86CC-F268512C5582}" type="datetimeFigureOut">
               <a:rPr lang="en-US" smtClean="0"/>
-              <a:t>6/15/23</a:t>
+              <a:t>9/25/23</a:t>
             </a:fld>
             <a:endParaRPr lang="en-US"/>
           </a:p>
@@ -2106,7 +2106,7 @@
           <a:p>
             <a:fld id="{86FBC258-72DF-554D-86CC-F268512C5582}" type="datetimeFigureOut">
               <a:rPr lang="en-US" smtClean="0"/>
-              <a:t>6/15/23</a:t>
+              <a:t>9/25/23</a:t>
             </a:fld>
             <a:endParaRPr lang="en-US"/>
           </a:p>
@@ -2417,7 +2417,7 @@
           <a:p>
             <a:fld id="{86FBC258-72DF-554D-86CC-F268512C5582}" type="datetimeFigureOut">
               <a:rPr lang="en-US" smtClean="0"/>
-              <a:t>6/15/23</a:t>
+              <a:t>9/25/23</a:t>
             </a:fld>
             <a:endParaRPr lang="en-US"/>
           </a:p>
@@ -2705,7 +2705,7 @@
           <a:p>
             <a:fld id="{86FBC258-72DF-554D-86CC-F268512C5582}" type="datetimeFigureOut">
               <a:rPr lang="en-US" smtClean="0"/>
-              <a:t>6/15/23</a:t>
+              <a:t>9/25/23</a:t>
             </a:fld>
             <a:endParaRPr lang="en-US"/>
           </a:p>
@@ -2946,7 +2946,7 @@
           <a:p>
             <a:fld id="{86FBC258-72DF-554D-86CC-F268512C5582}" type="datetimeFigureOut">
               <a:rPr lang="en-US" smtClean="0"/>
-              <a:t>6/15/23</a:t>
+              <a:t>9/25/23</a:t>
             </a:fld>
             <a:endParaRPr lang="en-US"/>
           </a:p>
@@ -4005,7 +4005,15 @@
           <a:p>
             <a:r>
               <a:rPr lang="en-US" dirty="0"/>
-              <a:t>Thus, as an exception unwinds the call stack looking for a handler…</a:t>
+              <a:t>Thus, as an exception </a:t>
+            </a:r>
+            <a:r>
+              <a:rPr lang="en-US" i="1" dirty="0"/>
+              <a:t>unwinds</a:t>
+            </a:r>
+            <a:r>
+              <a:rPr lang="en-US" dirty="0"/>
+              <a:t> the call stack looking for a handler…</a:t>
             </a:r>
           </a:p>
           <a:p>
@@ -5652,7 +5660,7 @@
           <a:p>
             <a:r>
               <a:rPr lang="en-US" dirty="0"/>
-              <a:t>It is used automatically by the compiler whenever you try to initialize an object by copying some other object (of the same type).</a:t>
+              <a:t>It is used automatically by the compiler whenever you try to initialize an object by copying some other object of the same type.</a:t>
             </a:r>
           </a:p>
           <a:p>
@@ -6479,7 +6487,15 @@
             <a:pPr lvl="1"/>
             <a:r>
               <a:rPr lang="en-US" dirty="0"/>
-              <a:t>… memory is the most common such resource, but…</a:t>
+              <a:t>… </a:t>
+            </a:r>
+            <a:r>
+              <a:rPr lang="en-US" b="1" dirty="0"/>
+              <a:t>memory</a:t>
+            </a:r>
+            <a:r>
+              <a:rPr lang="en-US" dirty="0"/>
+              <a:t> is the most common such resource, but…</a:t>
             </a:r>
           </a:p>
           <a:p>
@@ -6514,7 +6530,7 @@
             <a:pPr lvl="1"/>
             <a:r>
               <a:rPr lang="en-US" dirty="0"/>
-              <a:t>These are all examples.</a:t>
+              <a:t>There are other examples.</a:t>
             </a:r>
           </a:p>
         </p:txBody>
@@ -6595,12 +6611,14 @@
         </p:nvSpPr>
         <p:spPr>
           <a:xfrm>
-            <a:off x="838200" y="1825625"/>
-            <a:ext cx="10515600" cy="1603375"/>
+            <a:off x="838200" y="1690688"/>
+            <a:ext cx="10515600" cy="1802649"/>
           </a:xfrm>
         </p:spPr>
         <p:txBody>
-          <a:bodyPr/>
+          <a:bodyPr>
+            <a:normAutofit lnSpcReduction="10000"/>
+          </a:bodyPr>
           <a:lstStyle/>
           <a:p>
             <a:r>
@@ -6612,7 +6630,7 @@
             <a:pPr lvl="1"/>
             <a:r>
               <a:rPr lang="en-US" dirty="0"/>
-              <a:t>Also, in languages that only handle complicated types by reference (Java), the matter doesn’t come up because the references themselves are simple.</a:t>
+              <a:t>Also, in languages that only handle complicated types by reference (e.g., Java), the matter doesn’t come up because the references themselves are simple.</a:t>
             </a:r>
           </a:p>
         </p:txBody>
@@ -7513,7 +7531,7 @@
           <a:p>
             <a:r>
               <a:rPr lang="en-US" dirty="0"/>
-              <a:t>x be removed. Then new storage is</a:t>
+              <a:t>x be removed. Then, new storage is</a:t>
             </a:r>
           </a:p>
           <a:p>
@@ -8540,7 +8558,7 @@
           <a:p>
             <a:r>
               <a:rPr lang="en-US" dirty="0"/>
-              <a:t>Now, suppose it does throw? Where does that leave the object?</a:t>
+              <a:t>Now, suppose it does throw. Where does that leave the object?</a:t>
             </a:r>
           </a:p>
           <a:p>
@@ -9730,7 +9748,7 @@
                 <a:latin typeface="Courier New" panose="02070309020205020404" pitchFamily="49" charset="0"/>
                 <a:cs typeface="Courier New" panose="02070309020205020404" pitchFamily="49" charset="0"/>
               </a:rPr>
-              <a:t>] = array[k];   // When k == </a:t>
+              <a:t>] = array[k];   // When </a:t>
             </a:r>
             <a:r>
               <a:rPr lang="en-US" dirty="0" err="1">
@@ -9744,7 +9762,7 @@
                 <a:latin typeface="Courier New" panose="02070309020205020404" pitchFamily="49" charset="0"/>
                 <a:cs typeface="Courier New" panose="02070309020205020404" pitchFamily="49" charset="0"/>
               </a:rPr>
-              <a:t> this assigns array[k] to itself.</a:t>
+              <a:t> == k this assigns array[k] to itself.</a:t>
             </a:r>
           </a:p>
           <a:p>
@@ -11228,7 +11246,7 @@
             <a:pPr lvl="1"/>
             <a:r>
               <a:rPr lang="en-US" dirty="0"/>
-              <a:t>But it will stop people who care from chaining assignments.</a:t>
+              <a:t>But it will prevent chaining assignments.</a:t>
             </a:r>
           </a:p>
           <a:p>
@@ -12093,7 +12111,10 @@
           <a:bodyPr/>
           <a:lstStyle/>
           <a:p>
-            <a:endParaRPr lang="en-US" dirty="0"/>
+            <a:r>
+              <a:rPr lang="en-US" i="1" dirty="0"/>
+              <a:t>FINISH ME!</a:t>
+            </a:r>
           </a:p>
         </p:txBody>
       </p:sp>
@@ -13317,7 +13338,7 @@
           <a:p>
             <a:r>
               <a:rPr lang="en-US" dirty="0"/>
-              <a:t>During construction, the members of a const object are not automatically considered to be const.</a:t>
+              <a:t>During construction, the members of a const object are not considered to be const.</a:t>
             </a:r>
           </a:p>
           <a:p>
@@ -13330,7 +13351,7 @@
           <a:p>
             <a:r>
               <a:rPr lang="en-US" dirty="0"/>
-              <a:t>Also… during destruction, the members of a const object are again not automatically considered to be const.</a:t>
+              <a:t>Also… during destruction, the members of a const object are again not considered to be const.</a:t>
             </a:r>
           </a:p>
           <a:p>

</xml_diff>